<commit_message>
update static proxy pic
</commit_message>
<xml_diff>
--- a/MySpring/代理模式.pptx
+++ b/MySpring/代理模式.pptx
@@ -3184,14 +3184,6 @@
               </a:rPr>
               <a:t>SubwaySecurity</a:t>
             </a:r>
-            <a:endParaRPr lang="en-US" altLang="zh-CN" sz="1600" b="1" dirty="0">
-              <a:solidFill>
-                <a:schemeClr val="tx1">
-                  <a:lumMod val="95000"/>
-                  <a:lumOff val="5000"/>
-                </a:schemeClr>
-              </a:solidFill>
-            </a:endParaRPr>
           </a:p>
           <a:p>
             <a:pPr algn="ctr"/>
@@ -3204,18 +3196,7 @@
                   </a:schemeClr>
                 </a:solidFill>
               </a:rPr>
-              <a:t>pass</a:t>
-            </a:r>
-            <a:r>
-              <a:rPr lang="en-US" altLang="zh-CN" sz="1600" b="1" dirty="0">
-                <a:solidFill>
-                  <a:schemeClr val="tx1">
-                    <a:lumMod val="95000"/>
-                    <a:lumOff val="5000"/>
-                  </a:schemeClr>
-                </a:solidFill>
-              </a:rPr>
-              <a:t>()</a:t>
+              <a:t>pass()</a:t>
             </a:r>
             <a:endParaRPr lang="zh-CN" altLang="en-US" sz="1600" b="1" dirty="0">
               <a:solidFill>
@@ -3685,14 +3666,6 @@
               </a:rPr>
               <a:t>SubwaySecurity</a:t>
             </a:r>
-            <a:endParaRPr lang="en-US" altLang="zh-CN" sz="1600" b="1" dirty="0">
-              <a:solidFill>
-                <a:schemeClr val="tx1">
-                  <a:lumMod val="95000"/>
-                  <a:lumOff val="5000"/>
-                </a:schemeClr>
-              </a:solidFill>
-            </a:endParaRPr>
           </a:p>
           <a:p>
             <a:pPr algn="ctr"/>
@@ -3705,18 +3678,7 @@
                   </a:schemeClr>
                 </a:solidFill>
               </a:rPr>
-              <a:t>pass</a:t>
-            </a:r>
-            <a:r>
-              <a:rPr lang="en-US" altLang="zh-CN" sz="1600" b="1" dirty="0">
-                <a:solidFill>
-                  <a:schemeClr val="tx1">
-                    <a:lumMod val="95000"/>
-                    <a:lumOff val="5000"/>
-                  </a:schemeClr>
-                </a:solidFill>
-              </a:rPr>
-              <a:t>()</a:t>
+              <a:t>pass()</a:t>
             </a:r>
             <a:endParaRPr lang="zh-CN" altLang="en-US" sz="1600" b="1" dirty="0">
               <a:solidFill>
@@ -4054,18 +4016,7 @@
                   </a:schemeClr>
                 </a:solidFill>
               </a:rPr>
-              <a:t>pass</a:t>
-            </a:r>
-            <a:r>
-              <a:rPr lang="en-US" altLang="zh-CN" sz="1600" b="1" dirty="0">
-                <a:solidFill>
-                  <a:schemeClr val="tx1">
-                    <a:lumMod val="95000"/>
-                    <a:lumOff val="5000"/>
-                  </a:schemeClr>
-                </a:solidFill>
-              </a:rPr>
-              <a:t>()</a:t>
+              <a:t>pass()</a:t>
             </a:r>
             <a:endParaRPr lang="zh-CN" altLang="en-US" sz="1600" b="1" dirty="0">
               <a:solidFill>
@@ -4350,6 +4301,145 @@
             <a:r>
               <a:rPr lang="zh-CN" altLang="en-US" dirty="0" smtClean="0"/>
               <a:t>实现</a:t>
+            </a:r>
+            <a:endParaRPr lang="zh-CN" altLang="en-US" dirty="0"/>
+          </a:p>
+        </p:txBody>
+      </p:sp>
+      <p:sp>
+        <p:nvSpPr>
+          <p:cNvPr id="2" name="矩形 1"/>
+          <p:cNvSpPr/>
+          <p:nvPr/>
+        </p:nvSpPr>
+        <p:spPr>
+          <a:xfrm>
+            <a:off x="2959769" y="3237470"/>
+            <a:ext cx="4780548" cy="1260389"/>
+          </a:xfrm>
+          <a:prstGeom prst="rect">
+            <a:avLst/>
+          </a:prstGeom>
+          <a:noFill/>
+          <a:ln w="38100">
+            <a:solidFill>
+              <a:srgbClr val="FF0000"/>
+            </a:solidFill>
+            <a:prstDash val="dash"/>
+          </a:ln>
+        </p:spPr>
+        <p:style>
+          <a:lnRef idx="2">
+            <a:schemeClr val="accent1">
+              <a:shade val="50000"/>
+            </a:schemeClr>
+          </a:lnRef>
+          <a:fillRef idx="1">
+            <a:schemeClr val="accent1"/>
+          </a:fillRef>
+          <a:effectRef idx="0">
+            <a:schemeClr val="accent1"/>
+          </a:effectRef>
+          <a:fontRef idx="minor">
+            <a:schemeClr val="lt1"/>
+          </a:fontRef>
+        </p:style>
+        <p:txBody>
+          <a:bodyPr rtlCol="0" anchor="ctr"/>
+          <a:lstStyle/>
+          <a:p>
+            <a:pPr algn="ctr"/>
+            <a:endParaRPr lang="zh-CN" altLang="en-US"/>
+          </a:p>
+        </p:txBody>
+      </p:sp>
+      <p:sp>
+        <p:nvSpPr>
+          <p:cNvPr id="3" name="文本框 2"/>
+          <p:cNvSpPr txBox="1"/>
+          <p:nvPr/>
+        </p:nvSpPr>
+        <p:spPr>
+          <a:xfrm>
+            <a:off x="2640795" y="4634813"/>
+            <a:ext cx="5427379" cy="369332"/>
+          </a:xfrm>
+          <a:prstGeom prst="rect">
+            <a:avLst/>
+          </a:prstGeom>
+          <a:noFill/>
+        </p:spPr>
+        <p:txBody>
+          <a:bodyPr wrap="square" rtlCol="0">
+            <a:spAutoFit/>
+          </a:bodyPr>
+          <a:lstStyle/>
+          <a:p>
+            <a:r>
+              <a:rPr lang="zh-CN" altLang="en-US" dirty="0" smtClean="0"/>
+              <a:t>每个被代理类都对应一个代理类，容易造成“类爆炸”</a:t>
+            </a:r>
+            <a:endParaRPr lang="zh-CN" altLang="en-US" dirty="0"/>
+          </a:p>
+        </p:txBody>
+      </p:sp>
+      <p:sp>
+        <p:nvSpPr>
+          <p:cNvPr id="7" name="文本框 6"/>
+          <p:cNvSpPr txBox="1"/>
+          <p:nvPr/>
+        </p:nvSpPr>
+        <p:spPr>
+          <a:xfrm>
+            <a:off x="8679684" y="4629408"/>
+            <a:ext cx="1510154" cy="369332"/>
+          </a:xfrm>
+          <a:prstGeom prst="rect">
+            <a:avLst/>
+          </a:prstGeom>
+          <a:noFill/>
+        </p:spPr>
+        <p:txBody>
+          <a:bodyPr wrap="square" rtlCol="0">
+            <a:spAutoFit/>
+          </a:bodyPr>
+          <a:lstStyle/>
+          <a:p>
+            <a:pPr algn="ctr"/>
+            <a:r>
+              <a:rPr lang="zh-CN" altLang="en-US" dirty="0" smtClean="0"/>
+              <a:t>被代理类</a:t>
+            </a:r>
+            <a:endParaRPr lang="zh-CN" altLang="en-US" dirty="0"/>
+          </a:p>
+        </p:txBody>
+      </p:sp>
+      <p:sp>
+        <p:nvSpPr>
+          <p:cNvPr id="22" name="文本框 21"/>
+          <p:cNvSpPr txBox="1"/>
+          <p:nvPr/>
+        </p:nvSpPr>
+        <p:spPr>
+          <a:xfrm>
+            <a:off x="480165" y="4636704"/>
+            <a:ext cx="1510154" cy="369332"/>
+          </a:xfrm>
+          <a:prstGeom prst="rect">
+            <a:avLst/>
+          </a:prstGeom>
+          <a:noFill/>
+        </p:spPr>
+        <p:txBody>
+          <a:bodyPr wrap="square" rtlCol="0">
+            <a:spAutoFit/>
+          </a:bodyPr>
+          <a:lstStyle/>
+          <a:p>
+            <a:pPr algn="ctr"/>
+            <a:r>
+              <a:rPr lang="zh-CN" altLang="en-US" dirty="0" smtClean="0"/>
+              <a:t>被代理类</a:t>
             </a:r>
             <a:endParaRPr lang="zh-CN" altLang="en-US" dirty="0"/>
           </a:p>
@@ -4622,18 +4712,7 @@
                   </a:schemeClr>
                 </a:solidFill>
               </a:rPr>
-              <a:t>pass</a:t>
-            </a:r>
-            <a:r>
-              <a:rPr lang="en-US" altLang="zh-CN" sz="1600" b="1" dirty="0">
-                <a:solidFill>
-                  <a:schemeClr val="tx1">
-                    <a:lumMod val="95000"/>
-                    <a:lumOff val="5000"/>
-                  </a:schemeClr>
-                </a:solidFill>
-              </a:rPr>
-              <a:t>()</a:t>
+              <a:t>pass()</a:t>
             </a:r>
             <a:endParaRPr lang="zh-CN" altLang="en-US" sz="1600" b="1" dirty="0">
               <a:solidFill>
@@ -4915,18 +4994,7 @@
                   </a:schemeClr>
                 </a:solidFill>
               </a:rPr>
-              <a:t>invoke</a:t>
-            </a:r>
-            <a:r>
-              <a:rPr lang="en-US" altLang="zh-CN" sz="1600" b="1" dirty="0">
-                <a:solidFill>
-                  <a:schemeClr val="tx1">
-                    <a:lumMod val="95000"/>
-                    <a:lumOff val="5000"/>
-                  </a:schemeClr>
-                </a:solidFill>
-              </a:rPr>
-              <a:t>()</a:t>
+              <a:t>invoke()</a:t>
             </a:r>
             <a:endParaRPr lang="zh-CN" altLang="en-US" sz="1600" b="1" dirty="0">
               <a:solidFill>
@@ -5387,18 +5455,7 @@
                   </a:schemeClr>
                 </a:solidFill>
               </a:rPr>
-              <a:t>pass</a:t>
-            </a:r>
-            <a:r>
-              <a:rPr lang="en-US" altLang="zh-CN" sz="1600" b="1" dirty="0">
-                <a:solidFill>
-                  <a:schemeClr val="tx1">
-                    <a:lumMod val="95000"/>
-                    <a:lumOff val="5000"/>
-                  </a:schemeClr>
-                </a:solidFill>
-              </a:rPr>
-              <a:t>()</a:t>
+              <a:t>pass()</a:t>
             </a:r>
             <a:endParaRPr lang="zh-CN" altLang="en-US" sz="1600" b="1" dirty="0">
               <a:solidFill>

</xml_diff>